<commit_message>
Major update of the enrichment function
</commit_message>
<xml_diff>
--- a/Slides/Annotation_and_enrichment.pptx
+++ b/Slides/Annotation_and_enrichment.pptx
@@ -19,8 +19,8 @@
     <p:sldId id="264" r:id="rId10"/>
     <p:sldId id="265" r:id="rId11"/>
     <p:sldId id="266" r:id="rId12"/>
-    <p:sldId id="267" r:id="rId13"/>
-    <p:sldId id="268" r:id="rId14"/>
+    <p:sldId id="268" r:id="rId13"/>
+    <p:sldId id="267" r:id="rId14"/>
     <p:sldId id="269" r:id="rId15"/>
     <p:sldId id="270" r:id="rId16"/>
     <p:sldId id="271" r:id="rId17"/>
@@ -207,7 +207,7 @@
           <a:p>
             <a:fld id="{1E9ADF07-F6DC-3249-BBA6-A69AE78AFECA}" type="datetimeFigureOut">
               <a:rPr lang="en-US" smtClean="0"/>
-              <a:t>10/26/14</a:t>
+              <a:t>10/28/14</a:t>
             </a:fld>
             <a:endParaRPr lang="en-US"/>
           </a:p>
@@ -832,7 +832,7 @@
           <a:p>
             <a:fld id="{D302FC1D-6F05-5D4A-80CF-3D6C8794428A}" type="datetimeFigureOut">
               <a:rPr lang="en-US" smtClean="0"/>
-              <a:t>10/26/14</a:t>
+              <a:t>10/28/14</a:t>
             </a:fld>
             <a:endParaRPr lang="en-US"/>
           </a:p>
@@ -1002,7 +1002,7 @@
           <a:p>
             <a:fld id="{D302FC1D-6F05-5D4A-80CF-3D6C8794428A}" type="datetimeFigureOut">
               <a:rPr lang="en-US" smtClean="0"/>
-              <a:t>10/26/14</a:t>
+              <a:t>10/28/14</a:t>
             </a:fld>
             <a:endParaRPr lang="en-US"/>
           </a:p>
@@ -1182,7 +1182,7 @@
           <a:p>
             <a:fld id="{D302FC1D-6F05-5D4A-80CF-3D6C8794428A}" type="datetimeFigureOut">
               <a:rPr lang="en-US" smtClean="0"/>
-              <a:t>10/26/14</a:t>
+              <a:t>10/28/14</a:t>
             </a:fld>
             <a:endParaRPr lang="en-US"/>
           </a:p>
@@ -1352,7 +1352,7 @@
           <a:p>
             <a:fld id="{D302FC1D-6F05-5D4A-80CF-3D6C8794428A}" type="datetimeFigureOut">
               <a:rPr lang="en-US" smtClean="0"/>
-              <a:t>10/26/14</a:t>
+              <a:t>10/28/14</a:t>
             </a:fld>
             <a:endParaRPr lang="en-US"/>
           </a:p>
@@ -1598,7 +1598,7 @@
           <a:p>
             <a:fld id="{D302FC1D-6F05-5D4A-80CF-3D6C8794428A}" type="datetimeFigureOut">
               <a:rPr lang="en-US" smtClean="0"/>
-              <a:t>10/26/14</a:t>
+              <a:t>10/28/14</a:t>
             </a:fld>
             <a:endParaRPr lang="en-US"/>
           </a:p>
@@ -1886,7 +1886,7 @@
           <a:p>
             <a:fld id="{D302FC1D-6F05-5D4A-80CF-3D6C8794428A}" type="datetimeFigureOut">
               <a:rPr lang="en-US" smtClean="0"/>
-              <a:t>10/26/14</a:t>
+              <a:t>10/28/14</a:t>
             </a:fld>
             <a:endParaRPr lang="en-US"/>
           </a:p>
@@ -2308,7 +2308,7 @@
           <a:p>
             <a:fld id="{D302FC1D-6F05-5D4A-80CF-3D6C8794428A}" type="datetimeFigureOut">
               <a:rPr lang="en-US" smtClean="0"/>
-              <a:t>10/26/14</a:t>
+              <a:t>10/28/14</a:t>
             </a:fld>
             <a:endParaRPr lang="en-US"/>
           </a:p>
@@ -2426,7 +2426,7 @@
           <a:p>
             <a:fld id="{D302FC1D-6F05-5D4A-80CF-3D6C8794428A}" type="datetimeFigureOut">
               <a:rPr lang="en-US" smtClean="0"/>
-              <a:t>10/26/14</a:t>
+              <a:t>10/28/14</a:t>
             </a:fld>
             <a:endParaRPr lang="en-US"/>
           </a:p>
@@ -2521,7 +2521,7 @@
           <a:p>
             <a:fld id="{D302FC1D-6F05-5D4A-80CF-3D6C8794428A}" type="datetimeFigureOut">
               <a:rPr lang="en-US" smtClean="0"/>
-              <a:t>10/26/14</a:t>
+              <a:t>10/28/14</a:t>
             </a:fld>
             <a:endParaRPr lang="en-US"/>
           </a:p>
@@ -2798,7 +2798,7 @@
           <a:p>
             <a:fld id="{D302FC1D-6F05-5D4A-80CF-3D6C8794428A}" type="datetimeFigureOut">
               <a:rPr lang="en-US" smtClean="0"/>
-              <a:t>10/26/14</a:t>
+              <a:t>10/28/14</a:t>
             </a:fld>
             <a:endParaRPr lang="en-US"/>
           </a:p>
@@ -3051,7 +3051,7 @@
           <a:p>
             <a:fld id="{D302FC1D-6F05-5D4A-80CF-3D6C8794428A}" type="datetimeFigureOut">
               <a:rPr lang="en-US" smtClean="0"/>
-              <a:t>10/26/14</a:t>
+              <a:t>10/28/14</a:t>
             </a:fld>
             <a:endParaRPr lang="en-US"/>
           </a:p>
@@ -3264,7 +3264,7 @@
           <a:p>
             <a:fld id="{D302FC1D-6F05-5D4A-80CF-3D6C8794428A}" type="datetimeFigureOut">
               <a:rPr lang="en-US" smtClean="0"/>
-              <a:t>10/26/14</a:t>
+              <a:t>10/28/14</a:t>
             </a:fld>
             <a:endParaRPr lang="en-US"/>
           </a:p>
@@ -3689,6 +3689,67 @@
           </a:p>
         </p:txBody>
       </p:sp>
+      <p:sp>
+        <p:nvSpPr>
+          <p:cNvPr id="4" name="TextBox 3"/>
+          <p:cNvSpPr txBox="1"/>
+          <p:nvPr/>
+        </p:nvSpPr>
+        <p:spPr>
+          <a:xfrm>
+            <a:off x="2817799" y="5562600"/>
+            <a:ext cx="3545712" cy="923330"/>
+          </a:xfrm>
+          <a:prstGeom prst="rect">
+            <a:avLst/>
+          </a:prstGeom>
+          <a:noFill/>
+        </p:spPr>
+        <p:txBody>
+          <a:bodyPr wrap="none" rtlCol="0">
+            <a:spAutoFit/>
+          </a:bodyPr>
+          <a:lstStyle/>
+          <a:p>
+            <a:pPr algn="ctr"/>
+            <a:r>
+              <a:rPr lang="en-US" dirty="0" smtClean="0">
+                <a:latin typeface="Arial" pitchFamily="34" charset="0"/>
+                <a:cs typeface="Arial" pitchFamily="34" charset="0"/>
+              </a:rPr>
+              <a:t>Mikhail Dozmorov</a:t>
+            </a:r>
+          </a:p>
+          <a:p>
+            <a:pPr algn="ctr"/>
+            <a:r>
+              <a:rPr lang="en-US" dirty="0" smtClean="0">
+                <a:latin typeface="Arial" pitchFamily="34" charset="0"/>
+                <a:cs typeface="Arial" pitchFamily="34" charset="0"/>
+              </a:rPr>
+              <a:t>Department of Biostatistics, VCU</a:t>
+            </a:r>
+          </a:p>
+          <a:p>
+            <a:pPr algn="ctr"/>
+            <a:r>
+              <a:rPr lang="en-US" dirty="0" smtClean="0">
+                <a:latin typeface="Arial" pitchFamily="34" charset="0"/>
+                <a:cs typeface="Arial" pitchFamily="34" charset="0"/>
+                <a:hlinkClick r:id="rId2"/>
+              </a:rPr>
+              <a:t>mdozmorov@vcu.edu</a:t>
+            </a:r>
+            <a:r>
+              <a:rPr lang="en-US" dirty="0" smtClean="0">
+                <a:latin typeface="Arial" pitchFamily="34" charset="0"/>
+                <a:cs typeface="Arial" pitchFamily="34" charset="0"/>
+              </a:rPr>
+              <a:t> </a:t>
+            </a:r>
+          </a:p>
+        </p:txBody>
+      </p:sp>
     </p:spTree>
     <p:extLst>
       <p:ext uri="{BB962C8B-B14F-4D97-AF65-F5344CB8AC3E}">
@@ -3699,6 +3760,13 @@
   <p:clrMapOvr>
     <a:masterClrMapping/>
   </p:clrMapOvr>
+  <p:timing>
+    <p:tnLst>
+      <p:par>
+        <p:cTn xmlns:p14="http://schemas.microsoft.com/office/powerpoint/2010/main" id="1" dur="indefinite" restart="never" nodeType="tmRoot"/>
+      </p:par>
+    </p:tnLst>
+  </p:timing>
 </p:sld>
 </file>
 
@@ -3736,11 +3804,7 @@
           <a:p>
             <a:r>
               <a:rPr lang="en-US" dirty="0" smtClean="0"/>
-              <a:t>Enrichment analysis</a:t>
-            </a:r>
-            <a:r>
-              <a:rPr lang="en-US" dirty="0" smtClean="0"/>
-              <a:t> of genes</a:t>
+              <a:t>Enrichment analysis of genes</a:t>
             </a:r>
             <a:endParaRPr lang="en-US" dirty="0"/>
           </a:p>
@@ -3873,6 +3937,81 @@
   <p:clrMapOvr>
     <a:masterClrMapping/>
   </p:clrMapOvr>
+  <p:timing>
+    <p:tnLst>
+      <p:par>
+        <p:cTn xmlns:p14="http://schemas.microsoft.com/office/powerpoint/2010/main" id="1" dur="indefinite" restart="never" nodeType="tmRoot">
+          <p:childTnLst>
+            <p:seq concurrent="1" nextAc="seek">
+              <p:cTn id="2" dur="indefinite" nodeType="mainSeq">
+                <p:childTnLst>
+                  <p:par>
+                    <p:cTn id="3" fill="hold">
+                      <p:stCondLst>
+                        <p:cond delay="indefinite"/>
+                      </p:stCondLst>
+                      <p:childTnLst>
+                        <p:par>
+                          <p:cTn id="4" fill="hold">
+                            <p:stCondLst>
+                              <p:cond delay="0"/>
+                            </p:stCondLst>
+                            <p:childTnLst>
+                              <p:par>
+                                <p:cTn id="5" presetID="1" presetClass="entr" presetSubtype="0" fill="hold" nodeType="clickEffect">
+                                  <p:stCondLst>
+                                    <p:cond delay="0"/>
+                                  </p:stCondLst>
+                                  <p:childTnLst>
+                                    <p:set>
+                                      <p:cBhvr>
+                                        <p:cTn id="6" dur="1" fill="hold">
+                                          <p:stCondLst>
+                                            <p:cond delay="0"/>
+                                          </p:stCondLst>
+                                        </p:cTn>
+                                        <p:tgtEl>
+                                          <p:spTgt spid="7"/>
+                                        </p:tgtEl>
+                                        <p:attrNameLst>
+                                          <p:attrName>style.visibility</p:attrName>
+                                        </p:attrNameLst>
+                                      </p:cBhvr>
+                                      <p:to>
+                                        <p:strVal val="visible"/>
+                                      </p:to>
+                                    </p:set>
+                                  </p:childTnLst>
+                                </p:cTn>
+                              </p:par>
+                            </p:childTnLst>
+                          </p:cTn>
+                        </p:par>
+                      </p:childTnLst>
+                    </p:cTn>
+                  </p:par>
+                </p:childTnLst>
+              </p:cTn>
+              <p:prevCondLst>
+                <p:cond evt="onPrev" delay="0">
+                  <p:tgtEl>
+                    <p:sldTgt/>
+                  </p:tgtEl>
+                </p:cond>
+              </p:prevCondLst>
+              <p:nextCondLst>
+                <p:cond evt="onNext" delay="0">
+                  <p:tgtEl>
+                    <p:sldTgt/>
+                  </p:tgtEl>
+                </p:cond>
+              </p:nextCondLst>
+            </p:seq>
+          </p:childTnLst>
+        </p:cTn>
+      </p:par>
+    </p:tnLst>
+  </p:timing>
 </p:sld>
 </file>
 
@@ -3935,14 +4074,29 @@
           <a:p>
             <a:r>
               <a:rPr lang="en-US" dirty="0" smtClean="0"/>
-              <a:t>Genes cover only ~2% of the human genome</a:t>
-            </a:r>
-          </a:p>
-          <a:p>
+              <a:t>Genes cover only ~2% of the human </a:t>
+            </a:r>
             <a:r>
               <a:rPr lang="en-US" dirty="0" smtClean="0"/>
-              <a:t>Many regulatory regions, such as differentially methylated regions, are located outside of genes</a:t>
-            </a:r>
+              <a:t>genome</a:t>
+            </a:r>
+          </a:p>
+          <a:p>
+            <a:endParaRPr lang="en-US" dirty="0" smtClean="0"/>
+          </a:p>
+          <a:p>
+            <a:r>
+              <a:rPr lang="en-US" dirty="0" smtClean="0"/>
+              <a:t>Many regulatory regions, such as differentially methylated regions, are located outside of </a:t>
+            </a:r>
+            <a:r>
+              <a:rPr lang="en-US" dirty="0" smtClean="0"/>
+              <a:t>genes</a:t>
+            </a:r>
+            <a:br>
+              <a:rPr lang="en-US" dirty="0" smtClean="0"/>
+            </a:br>
+            <a:endParaRPr lang="en-US" dirty="0" smtClean="0"/>
           </a:p>
           <a:p>
             <a:r>
@@ -3963,115 +4117,17 @@
   <p:clrMapOvr>
     <a:masterClrMapping/>
   </p:clrMapOvr>
+  <p:timing>
+    <p:tnLst>
+      <p:par>
+        <p:cTn xmlns:p14="http://schemas.microsoft.com/office/powerpoint/2010/main" id="1" dur="indefinite" restart="never" nodeType="tmRoot"/>
+      </p:par>
+    </p:tnLst>
+  </p:timing>
 </p:sld>
 </file>
 
 <file path=ppt/slides/slide12.xml><?xml version="1.0" encoding="utf-8"?>
-<p:sld xmlns:a="http://schemas.openxmlformats.org/drawingml/2006/main" xmlns:r="http://schemas.openxmlformats.org/officeDocument/2006/relationships" xmlns:p="http://schemas.openxmlformats.org/presentationml/2006/main">
-  <p:cSld>
-    <p:spTree>
-      <p:nvGrpSpPr>
-        <p:cNvPr id="1" name=""/>
-        <p:cNvGrpSpPr/>
-        <p:nvPr/>
-      </p:nvGrpSpPr>
-      <p:grpSpPr>
-        <a:xfrm>
-          <a:off x="0" y="0"/>
-          <a:ext cx="0" cy="0"/>
-          <a:chOff x="0" y="0"/>
-          <a:chExt cx="0" cy="0"/>
-        </a:xfrm>
-      </p:grpSpPr>
-      <p:sp>
-        <p:nvSpPr>
-          <p:cNvPr id="2" name="Title 1"/>
-          <p:cNvSpPr>
-            <a:spLocks noGrp="1"/>
-          </p:cNvSpPr>
-          <p:nvPr>
-            <p:ph type="title"/>
-          </p:nvPr>
-        </p:nvSpPr>
-        <p:spPr/>
-        <p:txBody>
-          <a:bodyPr>
-            <a:normAutofit fontScale="90000"/>
-          </a:bodyPr>
-          <a:lstStyle/>
-          <a:p>
-            <a:r>
-              <a:rPr lang="en-US" dirty="0" smtClean="0"/>
-              <a:t>Enrichment analysis of genomic regions</a:t>
-            </a:r>
-            <a:endParaRPr lang="en-US" dirty="0"/>
-          </a:p>
-        </p:txBody>
-      </p:sp>
-      <p:sp>
-        <p:nvSpPr>
-          <p:cNvPr id="3" name="Content Placeholder 2"/>
-          <p:cNvSpPr>
-            <a:spLocks noGrp="1"/>
-          </p:cNvSpPr>
-          <p:nvPr>
-            <p:ph idx="1"/>
-          </p:nvPr>
-        </p:nvSpPr>
-        <p:spPr/>
-        <p:txBody>
-          <a:bodyPr/>
-          <a:lstStyle/>
-          <a:p>
-            <a:r>
-              <a:rPr lang="en-US" dirty="0" smtClean="0"/>
-              <a:t>Common approach</a:t>
-            </a:r>
-          </a:p>
-          <a:p>
-            <a:pPr lvl="1"/>
-            <a:r>
-              <a:rPr lang="en-US" dirty="0"/>
-              <a:t>M</a:t>
-            </a:r>
-            <a:r>
-              <a:rPr lang="en-US" dirty="0" smtClean="0"/>
-              <a:t>ap genomic regions to the nearby genes</a:t>
-            </a:r>
-          </a:p>
-          <a:p>
-            <a:pPr lvl="1"/>
-            <a:r>
-              <a:rPr lang="en-US" dirty="0" smtClean="0"/>
-              <a:t>Do enrichment analysis on the genes</a:t>
-            </a:r>
-          </a:p>
-          <a:p>
-            <a:pPr lvl="1"/>
-            <a:endParaRPr lang="en-US" dirty="0"/>
-          </a:p>
-          <a:p>
-            <a:endParaRPr lang="en-US" dirty="0" smtClean="0"/>
-          </a:p>
-          <a:p>
-            <a:endParaRPr lang="en-US" dirty="0"/>
-          </a:p>
-        </p:txBody>
-      </p:sp>
-    </p:spTree>
-    <p:extLst>
-      <p:ext uri="{BB962C8B-B14F-4D97-AF65-F5344CB8AC3E}">
-        <p14:creationId xmlns:p14="http://schemas.microsoft.com/office/powerpoint/2010/main" val="197314722"/>
-      </p:ext>
-    </p:extLst>
-  </p:cSld>
-  <p:clrMapOvr>
-    <a:masterClrMapping/>
-  </p:clrMapOvr>
-</p:sld>
-</file>
-
-<file path=ppt/slides/slide13.xml><?xml version="1.0" encoding="utf-8"?>
 <p:sld xmlns:a="http://schemas.openxmlformats.org/drawingml/2006/main" xmlns:r="http://schemas.openxmlformats.org/officeDocument/2006/relationships" xmlns:p="http://schemas.openxmlformats.org/presentationml/2006/main">
   <p:cSld>
     <p:spTree>
@@ -4436,6 +4492,291 @@
 </p:sld>
 </file>
 
+<file path=ppt/slides/slide13.xml><?xml version="1.0" encoding="utf-8"?>
+<p:sld xmlns:a="http://schemas.openxmlformats.org/drawingml/2006/main" xmlns:r="http://schemas.openxmlformats.org/officeDocument/2006/relationships" xmlns:p="http://schemas.openxmlformats.org/presentationml/2006/main">
+  <p:cSld>
+    <p:spTree>
+      <p:nvGrpSpPr>
+        <p:cNvPr id="1" name=""/>
+        <p:cNvGrpSpPr/>
+        <p:nvPr/>
+      </p:nvGrpSpPr>
+      <p:grpSpPr>
+        <a:xfrm>
+          <a:off x="0" y="0"/>
+          <a:ext cx="0" cy="0"/>
+          <a:chOff x="0" y="0"/>
+          <a:chExt cx="0" cy="0"/>
+        </a:xfrm>
+      </p:grpSpPr>
+      <p:sp>
+        <p:nvSpPr>
+          <p:cNvPr id="2" name="Title 1"/>
+          <p:cNvSpPr>
+            <a:spLocks noGrp="1"/>
+          </p:cNvSpPr>
+          <p:nvPr>
+            <p:ph type="title"/>
+          </p:nvPr>
+        </p:nvSpPr>
+        <p:spPr/>
+        <p:txBody>
+          <a:bodyPr>
+            <a:normAutofit fontScale="90000"/>
+          </a:bodyPr>
+          <a:lstStyle/>
+          <a:p>
+            <a:r>
+              <a:rPr lang="en-US" dirty="0" smtClean="0"/>
+              <a:t>Enrichment analysis of genomic regions</a:t>
+            </a:r>
+            <a:endParaRPr lang="en-US" dirty="0"/>
+          </a:p>
+        </p:txBody>
+      </p:sp>
+      <p:sp>
+        <p:nvSpPr>
+          <p:cNvPr id="3" name="Content Placeholder 2"/>
+          <p:cNvSpPr>
+            <a:spLocks noGrp="1"/>
+          </p:cNvSpPr>
+          <p:nvPr>
+            <p:ph idx="1"/>
+          </p:nvPr>
+        </p:nvSpPr>
+        <p:spPr/>
+        <p:txBody>
+          <a:bodyPr/>
+          <a:lstStyle/>
+          <a:p>
+            <a:r>
+              <a:rPr lang="en-US" dirty="0" smtClean="0"/>
+              <a:t>Common </a:t>
+            </a:r>
+            <a:r>
+              <a:rPr lang="en-US" dirty="0" smtClean="0"/>
+              <a:t>approach</a:t>
+            </a:r>
+            <a:endParaRPr lang="en-US" dirty="0" smtClean="0"/>
+          </a:p>
+          <a:p>
+            <a:pPr lvl="1"/>
+            <a:r>
+              <a:rPr lang="en-US" dirty="0"/>
+              <a:t>M</a:t>
+            </a:r>
+            <a:r>
+              <a:rPr lang="en-US" dirty="0" smtClean="0"/>
+              <a:t>ap genomic regions to the nearby </a:t>
+            </a:r>
+            <a:r>
+              <a:rPr lang="en-US" dirty="0" smtClean="0"/>
+              <a:t>genes</a:t>
+            </a:r>
+            <a:endParaRPr lang="en-US" dirty="0" smtClean="0"/>
+          </a:p>
+          <a:p>
+            <a:pPr lvl="1"/>
+            <a:r>
+              <a:rPr lang="en-US" dirty="0" smtClean="0"/>
+              <a:t>Do enrichment analysis on the </a:t>
+            </a:r>
+            <a:r>
+              <a:rPr lang="en-US" dirty="0" smtClean="0"/>
+              <a:t>genes</a:t>
+            </a:r>
+          </a:p>
+          <a:p>
+            <a:pPr lvl="1"/>
+            <a:endParaRPr lang="en-US" dirty="0"/>
+          </a:p>
+          <a:p>
+            <a:r>
+              <a:rPr lang="en-US" dirty="0" smtClean="0"/>
+              <a:t>Better approach</a:t>
+            </a:r>
+          </a:p>
+          <a:p>
+            <a:pPr lvl="1"/>
+            <a:r>
+              <a:rPr lang="en-US" dirty="0" smtClean="0"/>
+              <a:t>Map genomic regions to regulatory regions</a:t>
+            </a:r>
+          </a:p>
+          <a:p>
+            <a:pPr lvl="1"/>
+            <a:r>
+              <a:rPr lang="en-US" dirty="0" smtClean="0"/>
+              <a:t>Do enrichment analysis on the regulatory regions</a:t>
+            </a:r>
+            <a:endParaRPr lang="en-US" dirty="0" smtClean="0"/>
+          </a:p>
+          <a:p>
+            <a:pPr lvl="1"/>
+            <a:endParaRPr lang="en-US" dirty="0"/>
+          </a:p>
+          <a:p>
+            <a:endParaRPr lang="en-US" dirty="0" smtClean="0"/>
+          </a:p>
+          <a:p>
+            <a:endParaRPr lang="en-US" dirty="0"/>
+          </a:p>
+        </p:txBody>
+      </p:sp>
+    </p:spTree>
+    <p:extLst>
+      <p:ext uri="{BB962C8B-B14F-4D97-AF65-F5344CB8AC3E}">
+        <p14:creationId xmlns:p14="http://schemas.microsoft.com/office/powerpoint/2010/main" val="197314722"/>
+      </p:ext>
+    </p:extLst>
+  </p:cSld>
+  <p:clrMapOvr>
+    <a:masterClrMapping/>
+  </p:clrMapOvr>
+  <p:timing>
+    <p:tnLst>
+      <p:par>
+        <p:cTn xmlns:p14="http://schemas.microsoft.com/office/powerpoint/2010/main" id="1" dur="indefinite" restart="never" nodeType="tmRoot">
+          <p:childTnLst>
+            <p:seq concurrent="1" nextAc="seek">
+              <p:cTn id="2" dur="indefinite" nodeType="mainSeq">
+                <p:childTnLst>
+                  <p:par>
+                    <p:cTn id="3" fill="hold">
+                      <p:stCondLst>
+                        <p:cond delay="indefinite"/>
+                      </p:stCondLst>
+                      <p:childTnLst>
+                        <p:par>
+                          <p:cTn id="4" fill="hold">
+                            <p:stCondLst>
+                              <p:cond delay="0"/>
+                            </p:stCondLst>
+                            <p:childTnLst>
+                              <p:par>
+                                <p:cTn id="5" presetID="1" presetClass="entr" presetSubtype="0" fill="hold" nodeType="clickEffect">
+                                  <p:stCondLst>
+                                    <p:cond delay="0"/>
+                                  </p:stCondLst>
+                                  <p:childTnLst>
+                                    <p:set>
+                                      <p:cBhvr>
+                                        <p:cTn id="6" dur="1" fill="hold">
+                                          <p:stCondLst>
+                                            <p:cond delay="0"/>
+                                          </p:stCondLst>
+                                        </p:cTn>
+                                        <p:tgtEl>
+                                          <p:spTgt spid="3">
+                                            <p:txEl>
+                                              <p:pRg st="4" end="4"/>
+                                            </p:txEl>
+                                          </p:spTgt>
+                                        </p:tgtEl>
+                                        <p:attrNameLst>
+                                          <p:attrName>style.visibility</p:attrName>
+                                        </p:attrNameLst>
+                                      </p:cBhvr>
+                                      <p:to>
+                                        <p:strVal val="visible"/>
+                                      </p:to>
+                                    </p:set>
+                                  </p:childTnLst>
+                                </p:cTn>
+                              </p:par>
+                              <p:par>
+                                <p:cTn id="7" presetID="1" presetClass="entr" presetSubtype="0" fill="hold" nodeType="withEffect">
+                                  <p:stCondLst>
+                                    <p:cond delay="0"/>
+                                  </p:stCondLst>
+                                  <p:childTnLst>
+                                    <p:set>
+                                      <p:cBhvr>
+                                        <p:cTn id="8" dur="1" fill="hold">
+                                          <p:stCondLst>
+                                            <p:cond delay="0"/>
+                                          </p:stCondLst>
+                                        </p:cTn>
+                                        <p:tgtEl>
+                                          <p:spTgt spid="3">
+                                            <p:txEl>
+                                              <p:pRg st="5" end="5"/>
+                                            </p:txEl>
+                                          </p:spTgt>
+                                        </p:tgtEl>
+                                        <p:attrNameLst>
+                                          <p:attrName>style.visibility</p:attrName>
+                                        </p:attrNameLst>
+                                      </p:cBhvr>
+                                      <p:to>
+                                        <p:strVal val="visible"/>
+                                      </p:to>
+                                    </p:set>
+                                  </p:childTnLst>
+                                </p:cTn>
+                              </p:par>
+                              <p:par>
+                                <p:cTn id="9" presetID="1" presetClass="entr" presetSubtype="0" fill="hold" nodeType="withEffect">
+                                  <p:stCondLst>
+                                    <p:cond delay="0"/>
+                                  </p:stCondLst>
+                                  <p:childTnLst>
+                                    <p:set>
+                                      <p:cBhvr>
+                                        <p:cTn id="10" dur="1" fill="hold">
+                                          <p:stCondLst>
+                                            <p:cond delay="0"/>
+                                          </p:stCondLst>
+                                        </p:cTn>
+                                        <p:tgtEl>
+                                          <p:spTgt spid="3">
+                                            <p:txEl>
+                                              <p:pRg st="6" end="6"/>
+                                            </p:txEl>
+                                          </p:spTgt>
+                                        </p:tgtEl>
+                                        <p:attrNameLst>
+                                          <p:attrName>style.visibility</p:attrName>
+                                        </p:attrNameLst>
+                                      </p:cBhvr>
+                                      <p:to>
+                                        <p:strVal val="visible"/>
+                                      </p:to>
+                                    </p:set>
+                                  </p:childTnLst>
+                                </p:cTn>
+                              </p:par>
+                            </p:childTnLst>
+                          </p:cTn>
+                        </p:par>
+                      </p:childTnLst>
+                    </p:cTn>
+                  </p:par>
+                </p:childTnLst>
+              </p:cTn>
+              <p:prevCondLst>
+                <p:cond evt="onPrev" delay="0">
+                  <p:tgtEl>
+                    <p:sldTgt/>
+                  </p:tgtEl>
+                </p:cond>
+              </p:prevCondLst>
+              <p:nextCondLst>
+                <p:cond evt="onNext" delay="0">
+                  <p:tgtEl>
+                    <p:sldTgt/>
+                  </p:tgtEl>
+                </p:cond>
+              </p:nextCondLst>
+            </p:seq>
+          </p:childTnLst>
+        </p:cTn>
+      </p:par>
+    </p:tnLst>
+  </p:timing>
+</p:sld>
+</file>
+
 <file path=ppt/slides/slide14.xml><?xml version="1.0" encoding="utf-8"?>
 <p:sld xmlns:a="http://schemas.openxmlformats.org/drawingml/2006/main" xmlns:r="http://schemas.openxmlformats.org/officeDocument/2006/relationships" xmlns:p="http://schemas.openxmlformats.org/presentationml/2006/main">
   <p:cSld>
@@ -4474,7 +4815,6 @@
               <a:rPr lang="en-US" sz="3600" dirty="0" smtClean="0"/>
               <a:t>Enrichment analysis of everything in the genome</a:t>
             </a:r>
-            <a:endParaRPr lang="en-US" sz="3600" dirty="0" smtClean="0"/>
           </a:p>
         </p:txBody>
       </p:sp>
@@ -4509,11 +4849,7 @@
             </a:r>
             <a:r>
               <a:rPr lang="en-US" sz="3600" dirty="0" smtClean="0"/>
-              <a:t> – finds </a:t>
-            </a:r>
-            <a:r>
-              <a:rPr lang="en-US" sz="3600" dirty="0" smtClean="0"/>
-              <a:t>statistically significant associations within the genome and regulatory data</a:t>
+              <a:t> – finds statistically significant associations within the genome and regulatory data</a:t>
             </a:r>
           </a:p>
         </p:txBody>
@@ -12760,6 +13096,13 @@
   <p:clrMapOvr>
     <a:masterClrMapping/>
   </p:clrMapOvr>
+  <p:timing>
+    <p:tnLst>
+      <p:par>
+        <p:cTn xmlns:p14="http://schemas.microsoft.com/office/powerpoint/2010/main" id="1" dur="indefinite" restart="never" nodeType="tmRoot"/>
+      </p:par>
+    </p:tnLst>
+  </p:timing>
 </p:sld>
 </file>
 
@@ -12820,8 +13163,15 @@
           <a:p>
             <a:r>
               <a:rPr lang="en-US" dirty="0" smtClean="0"/>
-              <a:t>Understanding the biology behind gene expression and genomic differences</a:t>
-            </a:r>
+              <a:t>Understanding the biology behind gene expression and genomic </a:t>
+            </a:r>
+            <a:r>
+              <a:rPr lang="en-US" dirty="0" smtClean="0"/>
+              <a:t>differences</a:t>
+            </a:r>
+          </a:p>
+          <a:p>
+            <a:endParaRPr lang="en-US" dirty="0" smtClean="0"/>
           </a:p>
           <a:p>
             <a:r>
@@ -12842,6 +13192,13 @@
   <p:clrMapOvr>
     <a:masterClrMapping/>
   </p:clrMapOvr>
+  <p:timing>
+    <p:tnLst>
+      <p:par>
+        <p:cTn xmlns:p14="http://schemas.microsoft.com/office/powerpoint/2010/main" id="1" dur="indefinite" restart="never" nodeType="tmRoot"/>
+      </p:par>
+    </p:tnLst>
+  </p:timing>
 </p:sld>
 </file>
 
@@ -12956,6 +13313,13 @@
   <p:clrMapOvr>
     <a:masterClrMapping/>
   </p:clrMapOvr>
+  <p:timing>
+    <p:tnLst>
+      <p:par>
+        <p:cTn xmlns:p14="http://schemas.microsoft.com/office/powerpoint/2010/main" id="1" dur="indefinite" restart="never" nodeType="tmRoot"/>
+      </p:par>
+    </p:tnLst>
+  </p:timing>
 </p:sld>
 </file>
 
@@ -13134,6 +13498,13 @@
   <p:clrMapOvr>
     <a:masterClrMapping/>
   </p:clrMapOvr>
+  <p:timing>
+    <p:tnLst>
+      <p:par>
+        <p:cTn xmlns:p14="http://schemas.microsoft.com/office/powerpoint/2010/main" id="1" dur="indefinite" restart="never" nodeType="tmRoot"/>
+      </p:par>
+    </p:tnLst>
+  </p:timing>
 </p:sld>
 </file>
 
@@ -13264,6 +13635,13 @@
   <p:clrMapOvr>
     <a:masterClrMapping/>
   </p:clrMapOvr>
+  <p:timing>
+    <p:tnLst>
+      <p:par>
+        <p:cTn xmlns:p14="http://schemas.microsoft.com/office/powerpoint/2010/main" id="1" dur="indefinite" restart="never" nodeType="tmRoot"/>
+      </p:par>
+    </p:tnLst>
+  </p:timing>
 </p:sld>
 </file>
 
@@ -13393,6 +13771,13 @@
   <p:clrMapOvr>
     <a:masterClrMapping/>
   </p:clrMapOvr>
+  <p:timing>
+    <p:tnLst>
+      <p:par>
+        <p:cTn xmlns:p14="http://schemas.microsoft.com/office/powerpoint/2010/main" id="1" dur="indefinite" restart="never" nodeType="tmRoot"/>
+      </p:par>
+    </p:tnLst>
+  </p:timing>
 </p:sld>
 </file>
 
@@ -13527,6 +13912,13 @@
   <p:clrMapOvr>
     <a:masterClrMapping/>
   </p:clrMapOvr>
+  <p:timing>
+    <p:tnLst>
+      <p:par>
+        <p:cTn xmlns:p14="http://schemas.microsoft.com/office/powerpoint/2010/main" id="1" dur="indefinite" restart="never" nodeType="tmRoot"/>
+      </p:par>
+    </p:tnLst>
+  </p:timing>
 </p:sld>
 </file>
 
@@ -13564,11 +13956,7 @@
           <a:p>
             <a:r>
               <a:rPr lang="en-US" dirty="0" smtClean="0"/>
-              <a:t>Enrichment analysis</a:t>
-            </a:r>
-            <a:r>
-              <a:rPr lang="en-US" dirty="0" smtClean="0"/>
-              <a:t> of genes</a:t>
+              <a:t>Enrichment analysis of genes</a:t>
             </a:r>
             <a:endParaRPr lang="en-US" dirty="0"/>
           </a:p>
@@ -13645,6 +14033,13 @@
   <p:clrMapOvr>
     <a:masterClrMapping/>
   </p:clrMapOvr>
+  <p:timing>
+    <p:tnLst>
+      <p:par>
+        <p:cTn xmlns:p14="http://schemas.microsoft.com/office/powerpoint/2010/main" id="1" dur="indefinite" restart="never" nodeType="tmRoot"/>
+      </p:par>
+    </p:tnLst>
+  </p:timing>
 </p:sld>
 </file>
 

</xml_diff>